<commit_message>
finish the optimization of kpi1
</commit_message>
<xml_diff>
--- a/files/OXO Model conversion task.pptx
+++ b/files/OXO Model conversion task.pptx
@@ -119,6 +119,35 @@
 </p:presentation>
 </file>
 
+<file path=ppt/revisionInfo.xml><?xml version="1.0" encoding="utf-8"?>
+<p1510:revInfo xmlns:a="http://schemas.openxmlformats.org/drawingml/2006/main" xmlns:r="http://schemas.openxmlformats.org/officeDocument/2006/relationships" xmlns:p1510="http://schemas.microsoft.com/office/powerpoint/2015/10/main">
+  <p1510:revLst>
+    <p1510:client id="{C6E1F1D5-E66A-4F9E-A852-3D312B2F7B96}" v="1" dt="2023-07-12T13:54:32.200"/>
+  </p1510:revLst>
+</p1510:revInfo>
+</file>
+
+<file path=ppt/changesInfos/changesInfo1.xml><?xml version="1.0" encoding="utf-8"?>
+<pc:chgInfo xmlns:a="http://schemas.openxmlformats.org/drawingml/2006/main" xmlns:r="http://schemas.openxmlformats.org/officeDocument/2006/relationships" xmlns:ac="http://schemas.microsoft.com/office/drawing/2013/main/command" xmlns:pc="http://schemas.microsoft.com/office/powerpoint/2013/main/command">
+  <pc:docChgLst>
+    <pc:chgData name="Zhuoyu Feng" userId="b464db3a-a297-43fb-8206-6f1beda19308" providerId="ADAL" clId="{C6E1F1D5-E66A-4F9E-A852-3D312B2F7B96}"/>
+    <pc:docChg chg="addSld delSld modSld">
+      <pc:chgData name="Zhuoyu Feng" userId="b464db3a-a297-43fb-8206-6f1beda19308" providerId="ADAL" clId="{C6E1F1D5-E66A-4F9E-A852-3D312B2F7B96}" dt="2023-07-12T13:54:32.137" v="1"/>
+      <pc:docMkLst>
+        <pc:docMk/>
+      </pc:docMkLst>
+      <pc:sldChg chg="add del">
+        <pc:chgData name="Zhuoyu Feng" userId="b464db3a-a297-43fb-8206-6f1beda19308" providerId="ADAL" clId="{C6E1F1D5-E66A-4F9E-A852-3D312B2F7B96}" dt="2023-07-12T13:54:32.137" v="1"/>
+        <pc:sldMkLst>
+          <pc:docMk/>
+          <pc:sldMk cId="2393261275" sldId="262"/>
+        </pc:sldMkLst>
+      </pc:sldChg>
+    </pc:docChg>
+  </pc:docChgLst>
+</pc:chgInfo>
+</file>
+
 <file path=ppt/slideLayouts/slideLayout1.xml><?xml version="1.0" encoding="utf-8"?>
 <p:sldLayout xmlns:a="http://schemas.openxmlformats.org/drawingml/2006/main" xmlns:r="http://schemas.openxmlformats.org/officeDocument/2006/relationships" xmlns:p="http://schemas.openxmlformats.org/presentationml/2006/main" type="title" preserve="1">
   <p:cSld name="Title Slide">
@@ -266,7 +295,7 @@
           <a:p>
             <a:fld id="{E8D661B7-C462-4D19-8B8B-BE9FB7B69678}" type="datetimeFigureOut">
               <a:rPr lang="en-US" smtClean="0"/>
-              <a:t>4/5/2023</a:t>
+              <a:t>7/11/2023</a:t>
             </a:fld>
             <a:endParaRPr lang="en-US"/>
           </a:p>
@@ -464,7 +493,7 @@
           <a:p>
             <a:fld id="{E8D661B7-C462-4D19-8B8B-BE9FB7B69678}" type="datetimeFigureOut">
               <a:rPr lang="en-US" smtClean="0"/>
-              <a:t>4/5/2023</a:t>
+              <a:t>7/11/2023</a:t>
             </a:fld>
             <a:endParaRPr lang="en-US"/>
           </a:p>
@@ -672,7 +701,7 @@
           <a:p>
             <a:fld id="{E8D661B7-C462-4D19-8B8B-BE9FB7B69678}" type="datetimeFigureOut">
               <a:rPr lang="en-US" smtClean="0"/>
-              <a:t>4/5/2023</a:t>
+              <a:t>7/11/2023</a:t>
             </a:fld>
             <a:endParaRPr lang="en-US"/>
           </a:p>
@@ -870,7 +899,7 @@
           <a:p>
             <a:fld id="{E8D661B7-C462-4D19-8B8B-BE9FB7B69678}" type="datetimeFigureOut">
               <a:rPr lang="en-US" smtClean="0"/>
-              <a:t>4/5/2023</a:t>
+              <a:t>7/11/2023</a:t>
             </a:fld>
             <a:endParaRPr lang="en-US"/>
           </a:p>
@@ -1145,7 +1174,7 @@
           <a:p>
             <a:fld id="{E8D661B7-C462-4D19-8B8B-BE9FB7B69678}" type="datetimeFigureOut">
               <a:rPr lang="en-US" smtClean="0"/>
-              <a:t>4/5/2023</a:t>
+              <a:t>7/11/2023</a:t>
             </a:fld>
             <a:endParaRPr lang="en-US"/>
           </a:p>
@@ -1410,7 +1439,7 @@
           <a:p>
             <a:fld id="{E8D661B7-C462-4D19-8B8B-BE9FB7B69678}" type="datetimeFigureOut">
               <a:rPr lang="en-US" smtClean="0"/>
-              <a:t>4/5/2023</a:t>
+              <a:t>7/11/2023</a:t>
             </a:fld>
             <a:endParaRPr lang="en-US"/>
           </a:p>
@@ -1822,7 +1851,7 @@
           <a:p>
             <a:fld id="{E8D661B7-C462-4D19-8B8B-BE9FB7B69678}" type="datetimeFigureOut">
               <a:rPr lang="en-US" smtClean="0"/>
-              <a:t>4/5/2023</a:t>
+              <a:t>7/11/2023</a:t>
             </a:fld>
             <a:endParaRPr lang="en-US"/>
           </a:p>
@@ -1963,7 +1992,7 @@
           <a:p>
             <a:fld id="{E8D661B7-C462-4D19-8B8B-BE9FB7B69678}" type="datetimeFigureOut">
               <a:rPr lang="en-US" smtClean="0"/>
-              <a:t>4/5/2023</a:t>
+              <a:t>7/11/2023</a:t>
             </a:fld>
             <a:endParaRPr lang="en-US"/>
           </a:p>
@@ -2076,7 +2105,7 @@
           <a:p>
             <a:fld id="{E8D661B7-C462-4D19-8B8B-BE9FB7B69678}" type="datetimeFigureOut">
               <a:rPr lang="en-US" smtClean="0"/>
-              <a:t>4/5/2023</a:t>
+              <a:t>7/11/2023</a:t>
             </a:fld>
             <a:endParaRPr lang="en-US"/>
           </a:p>
@@ -2387,7 +2416,7 @@
           <a:p>
             <a:fld id="{E8D661B7-C462-4D19-8B8B-BE9FB7B69678}" type="datetimeFigureOut">
               <a:rPr lang="en-US" smtClean="0"/>
-              <a:t>4/5/2023</a:t>
+              <a:t>7/11/2023</a:t>
             </a:fld>
             <a:endParaRPr lang="en-US"/>
           </a:p>
@@ -2675,7 +2704,7 @@
           <a:p>
             <a:fld id="{E8D661B7-C462-4D19-8B8B-BE9FB7B69678}" type="datetimeFigureOut">
               <a:rPr lang="en-US" smtClean="0"/>
-              <a:t>4/5/2023</a:t>
+              <a:t>7/11/2023</a:t>
             </a:fld>
             <a:endParaRPr lang="en-US"/>
           </a:p>
@@ -2916,7 +2945,7 @@
           <a:p>
             <a:fld id="{E8D661B7-C462-4D19-8B8B-BE9FB7B69678}" type="datetimeFigureOut">
               <a:rPr lang="en-US" smtClean="0"/>
-              <a:t>4/5/2023</a:t>
+              <a:t>7/11/2023</a:t>
             </a:fld>
             <a:endParaRPr lang="en-US"/>
           </a:p>

</xml_diff>